<commit_message>
Slight alterations to animations
</commit_message>
<xml_diff>
--- a/Presentation.pptx
+++ b/Presentation.pptx
@@ -354,7 +354,7 @@
           </a:ln>
           <a:extLst>
             <a:ext uri="{C572A759-6A51-4108-AA02-DFA0A04FC94B}">
-              <ma14:wrappingTextBoxFlag xmlns="" xmlns:ma14="http://schemas.microsoft.com/office/mac/drawingml/2011/main" val="1"/>
+              <ma14:wrappingTextBoxFlag xmlns:ma14="http://schemas.microsoft.com/office/mac/drawingml/2011/main" xmlns="" val="1"/>
             </a:ext>
           </a:extLst>
         </p:spPr>
@@ -639,7 +639,7 @@
           </a:ln>
           <a:extLst>
             <a:ext uri="{C572A759-6A51-4108-AA02-DFA0A04FC94B}">
-              <ma14:wrappingTextBoxFlag xmlns="" xmlns:ma14="http://schemas.microsoft.com/office/mac/drawingml/2011/main" val="1"/>
+              <ma14:wrappingTextBoxFlag xmlns:ma14="http://schemas.microsoft.com/office/mac/drawingml/2011/main" xmlns="" val="1"/>
             </a:ext>
           </a:extLst>
         </p:spPr>
@@ -1030,7 +1030,7 @@
           </a:ln>
           <a:extLst>
             <a:ext uri="{C572A759-6A51-4108-AA02-DFA0A04FC94B}">
-              <ma14:wrappingTextBoxFlag xmlns="" xmlns:ma14="http://schemas.microsoft.com/office/mac/drawingml/2011/main" val="1"/>
+              <ma14:wrappingTextBoxFlag xmlns:ma14="http://schemas.microsoft.com/office/mac/drawingml/2011/main" xmlns="" val="1"/>
             </a:ext>
           </a:extLst>
         </p:spPr>
@@ -1121,7 +1121,7 @@
           </a:ln>
           <a:extLst>
             <a:ext uri="{C572A759-6A51-4108-AA02-DFA0A04FC94B}">
-              <ma14:wrappingTextBoxFlag xmlns="" xmlns:ma14="http://schemas.microsoft.com/office/mac/drawingml/2011/main" val="1"/>
+              <ma14:wrappingTextBoxFlag xmlns:ma14="http://schemas.microsoft.com/office/mac/drawingml/2011/main" xmlns="" val="1"/>
             </a:ext>
           </a:extLst>
         </p:spPr>
@@ -1199,7 +1199,7 @@
           </a:ln>
           <a:extLst>
             <a:ext uri="{C572A759-6A51-4108-AA02-DFA0A04FC94B}">
-              <ma14:wrappingTextBoxFlag xmlns="" xmlns:ma14="http://schemas.microsoft.com/office/mac/drawingml/2011/main" val="1"/>
+              <ma14:wrappingTextBoxFlag xmlns:ma14="http://schemas.microsoft.com/office/mac/drawingml/2011/main" xmlns="" val="1"/>
             </a:ext>
           </a:extLst>
         </p:spPr>
@@ -1422,7 +1422,7 @@
           </a:ln>
           <a:extLst>
             <a:ext uri="{C572A759-6A51-4108-AA02-DFA0A04FC94B}">
-              <ma14:wrappingTextBoxFlag xmlns="" xmlns:ma14="http://schemas.microsoft.com/office/mac/drawingml/2011/main" val="1"/>
+              <ma14:wrappingTextBoxFlag xmlns:ma14="http://schemas.microsoft.com/office/mac/drawingml/2011/main" xmlns="" val="1"/>
             </a:ext>
           </a:extLst>
         </p:spPr>
@@ -1470,7 +1470,7 @@
           </a:ln>
           <a:extLst>
             <a:ext uri="{C572A759-6A51-4108-AA02-DFA0A04FC94B}">
-              <ma14:wrappingTextBoxFlag xmlns="" xmlns:ma14="http://schemas.microsoft.com/office/mac/drawingml/2011/main" val="1"/>
+              <ma14:wrappingTextBoxFlag xmlns:ma14="http://schemas.microsoft.com/office/mac/drawingml/2011/main" xmlns="" val="1"/>
             </a:ext>
           </a:extLst>
         </p:spPr>
@@ -1775,7 +1775,7 @@
           </a:ln>
           <a:extLst>
             <a:ext uri="{C572A759-6A51-4108-AA02-DFA0A04FC94B}">
-              <ma14:wrappingTextBoxFlag xmlns="" xmlns:ma14="http://schemas.microsoft.com/office/mac/drawingml/2011/main" val="1"/>
+              <ma14:wrappingTextBoxFlag xmlns:ma14="http://schemas.microsoft.com/office/mac/drawingml/2011/main" xmlns="" val="1"/>
             </a:ext>
           </a:extLst>
         </p:spPr>
@@ -1820,7 +1820,7 @@
           </a:ln>
           <a:extLst>
             <a:ext uri="{C572A759-6A51-4108-AA02-DFA0A04FC94B}">
-              <ma14:wrappingTextBoxFlag xmlns="" xmlns:ma14="http://schemas.microsoft.com/office/mac/drawingml/2011/main" val="1"/>
+              <ma14:wrappingTextBoxFlag xmlns:ma14="http://schemas.microsoft.com/office/mac/drawingml/2011/main" xmlns="" val="1"/>
             </a:ext>
           </a:extLst>
         </p:spPr>
@@ -1896,7 +1896,7 @@
           </a:effectLst>
           <a:extLst>
             <a:ext uri="{C572A759-6A51-4108-AA02-DFA0A04FC94B}">
-              <ma14:wrappingTextBoxFlag xmlns="" xmlns:ma14="http://schemas.microsoft.com/office/mac/drawingml/2011/main" val="1"/>
+              <ma14:wrappingTextBoxFlag xmlns:ma14="http://schemas.microsoft.com/office/mac/drawingml/2011/main" xmlns="" val="1"/>
             </a:ext>
           </a:extLst>
         </p:spPr>
@@ -1937,7 +1937,7 @@
           </a:ln>
           <a:extLst>
             <a:ext uri="{C572A759-6A51-4108-AA02-DFA0A04FC94B}">
-              <ma14:wrappingTextBoxFlag xmlns="" xmlns:ma14="http://schemas.microsoft.com/office/mac/drawingml/2011/main" val="1"/>
+              <ma14:wrappingTextBoxFlag xmlns:ma14="http://schemas.microsoft.com/office/mac/drawingml/2011/main" xmlns="" val="1"/>
             </a:ext>
           </a:extLst>
         </p:spPr>
@@ -2473,7 +2473,7 @@
             <a:pPr lvl="0"/>
             <a:r>
               <a:rPr lang="nl-NL" dirty="0"/>
-              <a:t>Linda van der Pal - </a:t>
+              <a:t>Linda van der Pal – </a:t>
             </a:r>
             <a:r>
               <a:rPr lang="nl-NL" dirty="0" err="1"/>
@@ -2525,7 +2525,7 @@
             <a:pPr lvl="0"/>
             <a:r>
               <a:rPr lang="nl-NL" dirty="0"/>
-              <a:t>Emmanuel Bernard - </a:t>
+              <a:t>Emmanuel Bernard – </a:t>
             </a:r>
             <a:r>
               <a:rPr lang="nl-NL" dirty="0" err="1"/>
@@ -2704,9 +2704,14 @@
   <p:clrMapOvr>
     <a:masterClrMapping/>
   </p:clrMapOvr>
-  <p:transition>
-    <p:dissolve/>
-  </p:transition>
+  <mc:AlternateContent xmlns:mc="http://schemas.openxmlformats.org/markup-compatibility/2006">
+    <mc:Choice xmlns:p14="http://schemas.microsoft.com/office/powerpoint/2010/main" Requires="p14">
+      <p:transition p14:dur="0"/>
+    </mc:Choice>
+    <mc:Fallback>
+      <p:transition/>
+    </mc:Fallback>
+  </mc:AlternateContent>
 </p:sld>
 </file>
 
@@ -3974,33 +3979,15 @@
                                   </p:childTnLst>
                                 </p:cTn>
                               </p:par>
-                            </p:childTnLst>
-                          </p:cTn>
-                        </p:par>
-                      </p:childTnLst>
-                    </p:cTn>
-                  </p:par>
-                  <p:par>
-                    <p:cTn id="11" fill="hold">
-                      <p:stCondLst>
-                        <p:cond delay="indefinite"/>
-                      </p:stCondLst>
-                      <p:childTnLst>
-                        <p:par>
-                          <p:cTn id="12" fill="hold">
-                            <p:stCondLst>
-                              <p:cond delay="0"/>
-                            </p:stCondLst>
-                            <p:childTnLst>
                               <p:par>
-                                <p:cTn id="13" presetID="1" presetClass="entr" presetSubtype="0" fill="hold" nodeType="clickEffect">
+                                <p:cTn id="11" presetID="1" presetClass="entr" presetSubtype="0" fill="hold" nodeType="withEffect">
                                   <p:stCondLst>
                                     <p:cond delay="0"/>
                                   </p:stCondLst>
                                   <p:childTnLst>
                                     <p:set>
                                       <p:cBhvr>
-                                        <p:cTn id="14" dur="1" fill="hold">
+                                        <p:cTn id="12" dur="1" fill="hold">
                                           <p:stCondLst>
                                             <p:cond delay="0"/>
                                           </p:stCondLst>

</xml_diff>

<commit_message>
Last version of the presentation
</commit_message>
<xml_diff>
--- a/Presentation.pptx
+++ b/Presentation.pptx
@@ -5,7 +5,7 @@
     <p:sldMasterId id="2147483648" r:id="rId1"/>
   </p:sldMasterIdLst>
   <p:notesMasterIdLst>
-    <p:notesMasterId r:id="rId10"/>
+    <p:notesMasterId r:id="rId9"/>
   </p:notesMasterIdLst>
   <p:sldIdLst>
     <p:sldId id="256" r:id="rId2"/>
@@ -14,8 +14,7 @@
     <p:sldId id="259" r:id="rId5"/>
     <p:sldId id="260" r:id="rId6"/>
     <p:sldId id="261" r:id="rId7"/>
-    <p:sldId id="262" r:id="rId8"/>
-    <p:sldId id="263" r:id="rId9"/>
+    <p:sldId id="263" r:id="rId8"/>
   </p:sldIdLst>
   <p:sldSz cx="16256000" cy="9144000"/>
   <p:notesSz cx="6858000" cy="9144000"/>
@@ -95,7 +94,7 @@
   </p:defaultTextStyle>
   <p:extLst>
     <p:ext uri="{EFAFB233-063F-42B5-8137-9DF3F51BA10A}">
-      <p15:sldGuideLst xmlns:p15="http://schemas.microsoft.com/office/powerpoint/2012/main">
+      <p15:sldGuideLst xmlns:p15="http://schemas.microsoft.com/office/powerpoint/2012/main" xmlns="">
         <p15:guide id="1" orient="horz" pos="2880">
           <p15:clr>
             <a:srgbClr val="A4A3A4"/>
@@ -354,7 +353,7 @@
           </a:ln>
           <a:extLst>
             <a:ext uri="{C572A759-6A51-4108-AA02-DFA0A04FC94B}">
-              <ma14:wrappingTextBoxFlag xmlns:ma14="http://schemas.microsoft.com/office/mac/drawingml/2011/main" xmlns="" val="1"/>
+              <ma14:wrappingTextBoxFlag xmlns="" xmlns:ma14="http://schemas.microsoft.com/office/mac/drawingml/2011/main" val="1"/>
             </a:ext>
           </a:extLst>
         </p:spPr>
@@ -639,7 +638,7 @@
           </a:ln>
           <a:extLst>
             <a:ext uri="{C572A759-6A51-4108-AA02-DFA0A04FC94B}">
-              <ma14:wrappingTextBoxFlag xmlns:ma14="http://schemas.microsoft.com/office/mac/drawingml/2011/main" xmlns="" val="1"/>
+              <ma14:wrappingTextBoxFlag xmlns="" xmlns:ma14="http://schemas.microsoft.com/office/mac/drawingml/2011/main" val="1"/>
             </a:ext>
           </a:extLst>
         </p:spPr>
@@ -1030,7 +1029,7 @@
           </a:ln>
           <a:extLst>
             <a:ext uri="{C572A759-6A51-4108-AA02-DFA0A04FC94B}">
-              <ma14:wrappingTextBoxFlag xmlns:ma14="http://schemas.microsoft.com/office/mac/drawingml/2011/main" xmlns="" val="1"/>
+              <ma14:wrappingTextBoxFlag xmlns="" xmlns:ma14="http://schemas.microsoft.com/office/mac/drawingml/2011/main" val="1"/>
             </a:ext>
           </a:extLst>
         </p:spPr>
@@ -1121,7 +1120,7 @@
           </a:ln>
           <a:extLst>
             <a:ext uri="{C572A759-6A51-4108-AA02-DFA0A04FC94B}">
-              <ma14:wrappingTextBoxFlag xmlns:ma14="http://schemas.microsoft.com/office/mac/drawingml/2011/main" xmlns="" val="1"/>
+              <ma14:wrappingTextBoxFlag xmlns="" xmlns:ma14="http://schemas.microsoft.com/office/mac/drawingml/2011/main" val="1"/>
             </a:ext>
           </a:extLst>
         </p:spPr>
@@ -1199,7 +1198,7 @@
           </a:ln>
           <a:extLst>
             <a:ext uri="{C572A759-6A51-4108-AA02-DFA0A04FC94B}">
-              <ma14:wrappingTextBoxFlag xmlns:ma14="http://schemas.microsoft.com/office/mac/drawingml/2011/main" xmlns="" val="1"/>
+              <ma14:wrappingTextBoxFlag xmlns="" xmlns:ma14="http://schemas.microsoft.com/office/mac/drawingml/2011/main" val="1"/>
             </a:ext>
           </a:extLst>
         </p:spPr>
@@ -1422,7 +1421,7 @@
           </a:ln>
           <a:extLst>
             <a:ext uri="{C572A759-6A51-4108-AA02-DFA0A04FC94B}">
-              <ma14:wrappingTextBoxFlag xmlns:ma14="http://schemas.microsoft.com/office/mac/drawingml/2011/main" xmlns="" val="1"/>
+              <ma14:wrappingTextBoxFlag xmlns="" xmlns:ma14="http://schemas.microsoft.com/office/mac/drawingml/2011/main" val="1"/>
             </a:ext>
           </a:extLst>
         </p:spPr>
@@ -1470,7 +1469,7 @@
           </a:ln>
           <a:extLst>
             <a:ext uri="{C572A759-6A51-4108-AA02-DFA0A04FC94B}">
-              <ma14:wrappingTextBoxFlag xmlns:ma14="http://schemas.microsoft.com/office/mac/drawingml/2011/main" xmlns="" val="1"/>
+              <ma14:wrappingTextBoxFlag xmlns="" xmlns:ma14="http://schemas.microsoft.com/office/mac/drawingml/2011/main" val="1"/>
             </a:ext>
           </a:extLst>
         </p:spPr>
@@ -1775,7 +1774,7 @@
           </a:ln>
           <a:extLst>
             <a:ext uri="{C572A759-6A51-4108-AA02-DFA0A04FC94B}">
-              <ma14:wrappingTextBoxFlag xmlns:ma14="http://schemas.microsoft.com/office/mac/drawingml/2011/main" xmlns="" val="1"/>
+              <ma14:wrappingTextBoxFlag xmlns="" xmlns:ma14="http://schemas.microsoft.com/office/mac/drawingml/2011/main" val="1"/>
             </a:ext>
           </a:extLst>
         </p:spPr>
@@ -1820,7 +1819,7 @@
           </a:ln>
           <a:extLst>
             <a:ext uri="{C572A759-6A51-4108-AA02-DFA0A04FC94B}">
-              <ma14:wrappingTextBoxFlag xmlns:ma14="http://schemas.microsoft.com/office/mac/drawingml/2011/main" xmlns="" val="1"/>
+              <ma14:wrappingTextBoxFlag xmlns="" xmlns:ma14="http://schemas.microsoft.com/office/mac/drawingml/2011/main" val="1"/>
             </a:ext>
           </a:extLst>
         </p:spPr>
@@ -1896,7 +1895,7 @@
           </a:effectLst>
           <a:extLst>
             <a:ext uri="{C572A759-6A51-4108-AA02-DFA0A04FC94B}">
-              <ma14:wrappingTextBoxFlag xmlns:ma14="http://schemas.microsoft.com/office/mac/drawingml/2011/main" xmlns="" val="1"/>
+              <ma14:wrappingTextBoxFlag xmlns="" xmlns:ma14="http://schemas.microsoft.com/office/mac/drawingml/2011/main" val="1"/>
             </a:ext>
           </a:extLst>
         </p:spPr>
@@ -1937,7 +1936,7 @@
           </a:ln>
           <a:extLst>
             <a:ext uri="{C572A759-6A51-4108-AA02-DFA0A04FC94B}">
-              <ma14:wrappingTextBoxFlag xmlns:ma14="http://schemas.microsoft.com/office/mac/drawingml/2011/main" xmlns="" val="1"/>
+              <ma14:wrappingTextBoxFlag xmlns="" xmlns:ma14="http://schemas.microsoft.com/office/mac/drawingml/2011/main" val="1"/>
             </a:ext>
           </a:extLst>
         </p:spPr>
@@ -2505,19 +2504,11 @@
             <a:pPr lvl="0"/>
             <a:r>
               <a:rPr lang="nl-NL" dirty="0"/>
-              <a:t>Gunnar </a:t>
-            </a:r>
-            <a:r>
-              <a:rPr lang="nl-NL" dirty="0" err="1"/>
-              <a:t>Morling</a:t>
-            </a:r>
-            <a:r>
-              <a:rPr lang="nl-NL" dirty="0"/>
-              <a:t> – </a:t>
-            </a:r>
-            <a:r>
-              <a:rPr lang="nl-NL" dirty="0" err="1"/>
-              <a:t>Redhat</a:t>
+              <a:t>Gunnar Morling – </a:t>
+            </a:r>
+            <a:r>
+              <a:rPr lang="nl-NL" dirty="0" smtClean="0"/>
+              <a:t>Red Hat</a:t>
             </a:r>
             <a:endParaRPr lang="nl-NL" dirty="0"/>
           </a:p>
@@ -2528,8 +2519,8 @@
               <a:t>Emmanuel Bernard – </a:t>
             </a:r>
             <a:r>
-              <a:rPr lang="nl-NL" dirty="0" err="1"/>
-              <a:t>Redhat</a:t>
+              <a:rPr lang="nl-NL" dirty="0" smtClean="0"/>
+              <a:t>Red Hat</a:t>
             </a:r>
             <a:endParaRPr lang="nl-NL" dirty="0"/>
           </a:p>
@@ -2616,6 +2607,13 @@
     <a:masterClrMapping/>
   </p:clrMapOvr>
   <p:transition spd="med"/>
+  <p:timing>
+    <p:tnLst>
+      <p:par>
+        <p:cTn id="1" dur="indefinite" restart="never" nodeType="tmRoot"/>
+      </p:par>
+    </p:tnLst>
+  </p:timing>
 </p:sld>
 </file>
 
@@ -2657,8 +2655,8 @@
           <a:p>
             <a:pPr lvl="0"/>
             <a:r>
-              <a:rPr lang="en-US" dirty="0"/>
-              <a:t>Plan for the day</a:t>
+              <a:rPr lang="en-US" dirty="0" smtClean="0"/>
+              <a:t>Agenda</a:t>
             </a:r>
             <a:endParaRPr dirty="0"/>
           </a:p>
@@ -2686,8 +2684,35 @@
             <a:pPr lvl="0"/>
             <a:r>
               <a:rPr lang="en-US" dirty="0"/>
-              <a:t>Splitting up your problem into microservices</a:t>
-            </a:r>
+              <a:t>Splitting up your problem into </a:t>
+            </a:r>
+            <a:r>
+              <a:rPr lang="en-US" dirty="0" err="1" smtClean="0"/>
+              <a:t>microservices</a:t>
+            </a:r>
+            <a:endParaRPr lang="en-US" dirty="0" smtClean="0"/>
+          </a:p>
+          <a:p>
+            <a:pPr lvl="1"/>
+            <a:r>
+              <a:rPr lang="en-US" dirty="0" smtClean="0"/>
+              <a:t>Theory</a:t>
+            </a:r>
+          </a:p>
+          <a:p>
+            <a:pPr lvl="1"/>
+            <a:r>
+              <a:rPr lang="en-US" dirty="0" smtClean="0"/>
+              <a:t>Discussion</a:t>
+            </a:r>
+          </a:p>
+          <a:p>
+            <a:pPr lvl="1"/>
+            <a:r>
+              <a:rPr lang="en-US" dirty="0" smtClean="0"/>
+              <a:t>Programming</a:t>
+            </a:r>
+            <a:endParaRPr lang="en-US" dirty="0"/>
           </a:p>
           <a:p>
             <a:pPr lvl="0"/>
@@ -2704,14 +2729,21 @@
   <p:clrMapOvr>
     <a:masterClrMapping/>
   </p:clrMapOvr>
-  <mc:AlternateContent xmlns:mc="http://schemas.openxmlformats.org/markup-compatibility/2006">
-    <mc:Choice xmlns:p14="http://schemas.microsoft.com/office/powerpoint/2010/main" Requires="p14">
+  <mc:AlternateContent xmlns:mc="http://schemas.openxmlformats.org/markup-compatibility/2006" xmlns:p14="http://schemas.microsoft.com/office/powerpoint/2010/main">
+    <mc:Choice Requires="p14">
       <p:transition p14:dur="0"/>
     </mc:Choice>
-    <mc:Fallback>
+    <mc:Fallback xmlns="">
       <p:transition/>
     </mc:Fallback>
   </mc:AlternateContent>
+  <p:timing>
+    <p:tnLst>
+      <p:par>
+        <p:cTn id="1" dur="indefinite" restart="never" nodeType="tmRoot"/>
+      </p:par>
+    </p:tnLst>
+  </p:timing>
 </p:sld>
 </file>
 
@@ -2737,7 +2769,7 @@
           <p:cNvPr id="2" name="Title 1">
             <a:extLst>
               <a:ext uri="{FF2B5EF4-FFF2-40B4-BE49-F238E27FC236}">
-                <a16:creationId xmlns:a16="http://schemas.microsoft.com/office/drawing/2014/main" id="{24679B7A-8839-42B6-8289-174EBF704BC7}"/>
+                <a16:creationId xmlns:a16="http://schemas.microsoft.com/office/drawing/2014/main" xmlns="" id="{24679B7A-8839-42B6-8289-174EBF704BC7}"/>
               </a:ext>
             </a:extLst>
           </p:cNvPr>
@@ -2758,14 +2790,14 @@
               <a:t>Splitting up your problem into </a:t>
             </a:r>
             <a:r>
-              <a:rPr lang="en-NL" dirty="0"/>
+              <a:rPr lang="x-none" dirty="0"/>
               <a:t>µ</a:t>
             </a:r>
             <a:r>
               <a:rPr lang="en-US" dirty="0"/>
               <a:t>s</a:t>
             </a:r>
-            <a:endParaRPr lang="en-NL" dirty="0"/>
+            <a:endParaRPr lang="x-none" dirty="0"/>
           </a:p>
         </p:txBody>
       </p:sp>
@@ -2774,7 +2806,7 @@
           <p:cNvPr id="3" name="Text Placeholder 2">
             <a:extLst>
               <a:ext uri="{FF2B5EF4-FFF2-40B4-BE49-F238E27FC236}">
-                <a16:creationId xmlns:a16="http://schemas.microsoft.com/office/drawing/2014/main" id="{75C97829-E95C-4E50-B557-151DBF124C3B}"/>
+                <a16:creationId xmlns:a16="http://schemas.microsoft.com/office/drawing/2014/main" xmlns="" id="{75C97829-E95C-4E50-B557-151DBF124C3B}"/>
               </a:ext>
             </a:extLst>
           </p:cNvPr>
@@ -2812,7 +2844,7 @@
             </a:r>
           </a:p>
           <a:p>
-            <a:endParaRPr lang="en-NL" dirty="0"/>
+            <a:endParaRPr lang="x-none" dirty="0"/>
           </a:p>
         </p:txBody>
       </p:sp>
@@ -2827,6 +2859,13 @@
     <a:masterClrMapping/>
   </p:clrMapOvr>
   <p:transition spd="med"/>
+  <p:timing>
+    <p:tnLst>
+      <p:par>
+        <p:cTn id="1" dur="indefinite" restart="never" nodeType="tmRoot"/>
+      </p:par>
+    </p:tnLst>
+  </p:timing>
 </p:sld>
 </file>
 
@@ -2852,7 +2891,7 @@
           <p:cNvPr id="2" name="Title 1">
             <a:extLst>
               <a:ext uri="{FF2B5EF4-FFF2-40B4-BE49-F238E27FC236}">
-                <a16:creationId xmlns:a16="http://schemas.microsoft.com/office/drawing/2014/main" id="{154D44FC-1511-4BEF-A8DB-B37876479985}"/>
+                <a16:creationId xmlns:a16="http://schemas.microsoft.com/office/drawing/2014/main" xmlns="" id="{154D44FC-1511-4BEF-A8DB-B37876479985}"/>
               </a:ext>
             </a:extLst>
           </p:cNvPr>
@@ -2872,7 +2911,7 @@
               <a:rPr lang="en-US" dirty="0"/>
               <a:t>Possible splitting criteria</a:t>
             </a:r>
-            <a:endParaRPr lang="en-NL" dirty="0"/>
+            <a:endParaRPr lang="x-none" dirty="0"/>
           </a:p>
         </p:txBody>
       </p:sp>
@@ -2881,7 +2920,7 @@
           <p:cNvPr id="3" name="Text Placeholder 2">
             <a:extLst>
               <a:ext uri="{FF2B5EF4-FFF2-40B4-BE49-F238E27FC236}">
-                <a16:creationId xmlns:a16="http://schemas.microsoft.com/office/drawing/2014/main" id="{478D4888-F84C-4506-A44D-19FFBD49C912}"/>
+                <a16:creationId xmlns:a16="http://schemas.microsoft.com/office/drawing/2014/main" xmlns="" id="{478D4888-F84C-4506-A44D-19FFBD49C912}"/>
               </a:ext>
             </a:extLst>
           </p:cNvPr>
@@ -2936,7 +2975,7 @@
             </a:r>
           </a:p>
           <a:p>
-            <a:endParaRPr lang="en-NL" dirty="0"/>
+            <a:endParaRPr lang="x-none" dirty="0"/>
           </a:p>
         </p:txBody>
       </p:sp>
@@ -2951,6 +2990,13 @@
     <a:masterClrMapping/>
   </p:clrMapOvr>
   <p:transition spd="med"/>
+  <p:timing>
+    <p:tnLst>
+      <p:par>
+        <p:cTn id="1" dur="indefinite" restart="never" nodeType="tmRoot"/>
+      </p:par>
+    </p:tnLst>
+  </p:timing>
 </p:sld>
 </file>
 
@@ -2976,7 +3022,7 @@
           <p:cNvPr id="2" name="Title 1">
             <a:extLst>
               <a:ext uri="{FF2B5EF4-FFF2-40B4-BE49-F238E27FC236}">
-                <a16:creationId xmlns:a16="http://schemas.microsoft.com/office/drawing/2014/main" id="{2F6E074A-B24F-411F-952B-ED91DF41CF5B}"/>
+                <a16:creationId xmlns:a16="http://schemas.microsoft.com/office/drawing/2014/main" xmlns="" id="{2F6E074A-B24F-411F-952B-ED91DF41CF5B}"/>
               </a:ext>
             </a:extLst>
           </p:cNvPr>
@@ -2996,7 +3042,7 @@
               <a:rPr lang="en-US" dirty="0"/>
               <a:t>DDD terms explained</a:t>
             </a:r>
-            <a:endParaRPr lang="en-NL" dirty="0"/>
+            <a:endParaRPr lang="x-none" dirty="0"/>
           </a:p>
         </p:txBody>
       </p:sp>
@@ -3005,7 +3051,7 @@
           <p:cNvPr id="3" name="Text Placeholder 2">
             <a:extLst>
               <a:ext uri="{FF2B5EF4-FFF2-40B4-BE49-F238E27FC236}">
-                <a16:creationId xmlns:a16="http://schemas.microsoft.com/office/drawing/2014/main" id="{CB240F46-91B2-4CF6-8883-2C09A805540A}"/>
+                <a16:creationId xmlns:a16="http://schemas.microsoft.com/office/drawing/2014/main" xmlns="" id="{CB240F46-91B2-4CF6-8883-2C09A805540A}"/>
               </a:ext>
             </a:extLst>
           </p:cNvPr>
@@ -3051,7 +3097,7 @@
             </a:r>
           </a:p>
           <a:p>
-            <a:endParaRPr lang="en-NL" dirty="0"/>
+            <a:endParaRPr lang="x-none" dirty="0"/>
           </a:p>
         </p:txBody>
       </p:sp>
@@ -3060,7 +3106,7 @@
           <p:cNvPr id="4" name="Picture 2" descr="http://martinfowler.com/bliki/images/boundedContext/sketch.png">
             <a:extLst>
               <a:ext uri="{FF2B5EF4-FFF2-40B4-BE49-F238E27FC236}">
-                <a16:creationId xmlns:a16="http://schemas.microsoft.com/office/drawing/2014/main" id="{36C372F8-E257-4A39-A003-19C5FE139694}"/>
+                <a16:creationId xmlns:a16="http://schemas.microsoft.com/office/drawing/2014/main" xmlns="" id="{36C372F8-E257-4A39-A003-19C5FE139694}"/>
               </a:ext>
             </a:extLst>
           </p:cNvPr>
@@ -3113,6 +3159,13 @@
     <a:masterClrMapping/>
   </p:clrMapOvr>
   <p:transition spd="med"/>
+  <p:timing>
+    <p:tnLst>
+      <p:par>
+        <p:cTn id="1" dur="indefinite" restart="never" nodeType="tmRoot"/>
+      </p:par>
+    </p:tnLst>
+  </p:timing>
 </p:sld>
 </file>
 
@@ -3138,7 +3191,7 @@
           <p:cNvPr id="2" name="Title 1">
             <a:extLst>
               <a:ext uri="{FF2B5EF4-FFF2-40B4-BE49-F238E27FC236}">
-                <a16:creationId xmlns:a16="http://schemas.microsoft.com/office/drawing/2014/main" id="{998CAE74-A584-456F-834D-BF3E95270309}"/>
+                <a16:creationId xmlns:a16="http://schemas.microsoft.com/office/drawing/2014/main" xmlns="" id="{998CAE74-A584-456F-834D-BF3E95270309}"/>
               </a:ext>
             </a:extLst>
           </p:cNvPr>
@@ -3158,7 +3211,7 @@
               <a:rPr lang="en-US" dirty="0"/>
               <a:t>Building blocks</a:t>
             </a:r>
-            <a:endParaRPr lang="en-NL" dirty="0"/>
+            <a:endParaRPr lang="x-none" dirty="0"/>
           </a:p>
         </p:txBody>
       </p:sp>
@@ -3167,7 +3220,7 @@
           <p:cNvPr id="3" name="Text Placeholder 2">
             <a:extLst>
               <a:ext uri="{FF2B5EF4-FFF2-40B4-BE49-F238E27FC236}">
-                <a16:creationId xmlns:a16="http://schemas.microsoft.com/office/drawing/2014/main" id="{08B54D73-B271-4161-9C29-B447F6076D0B}"/>
+                <a16:creationId xmlns:a16="http://schemas.microsoft.com/office/drawing/2014/main" xmlns="" id="{08B54D73-B271-4161-9C29-B447F6076D0B}"/>
               </a:ext>
             </a:extLst>
           </p:cNvPr>
@@ -3207,7 +3260,7 @@
             </a:r>
           </a:p>
           <a:p>
-            <a:endParaRPr lang="en-NL" dirty="0"/>
+            <a:endParaRPr lang="x-none" dirty="0"/>
           </a:p>
         </p:txBody>
       </p:sp>
@@ -3216,7 +3269,7 @@
           <p:cNvPr id="4" name="Picture 3">
             <a:extLst>
               <a:ext uri="{FF2B5EF4-FFF2-40B4-BE49-F238E27FC236}">
-                <a16:creationId xmlns:a16="http://schemas.microsoft.com/office/drawing/2014/main" id="{25B14C2C-19CC-4761-ADA2-E402F98B417C}"/>
+                <a16:creationId xmlns:a16="http://schemas.microsoft.com/office/drawing/2014/main" xmlns="" id="{25B14C2C-19CC-4761-ADA2-E402F98B417C}"/>
               </a:ext>
             </a:extLst>
           </p:cNvPr>
@@ -3246,7 +3299,7 @@
           <p:cNvPr id="5" name="Picture 4">
             <a:extLst>
               <a:ext uri="{FF2B5EF4-FFF2-40B4-BE49-F238E27FC236}">
-                <a16:creationId xmlns:a16="http://schemas.microsoft.com/office/drawing/2014/main" id="{78086629-C023-4381-93CF-5195F9D03602}"/>
+                <a16:creationId xmlns:a16="http://schemas.microsoft.com/office/drawing/2014/main" xmlns="" id="{78086629-C023-4381-93CF-5195F9D03602}"/>
               </a:ext>
             </a:extLst>
           </p:cNvPr>
@@ -3276,7 +3329,7 @@
           <p:cNvPr id="6" name="Picture 5">
             <a:extLst>
               <a:ext uri="{FF2B5EF4-FFF2-40B4-BE49-F238E27FC236}">
-                <a16:creationId xmlns:a16="http://schemas.microsoft.com/office/drawing/2014/main" id="{A9959F32-4AA4-453E-BC9D-93393644749E}"/>
+                <a16:creationId xmlns:a16="http://schemas.microsoft.com/office/drawing/2014/main" xmlns="" id="{A9959F32-4AA4-453E-BC9D-93393644749E}"/>
               </a:ext>
             </a:extLst>
           </p:cNvPr>
@@ -3306,7 +3359,7 @@
           <p:cNvPr id="7" name="TextBox 6">
             <a:extLst>
               <a:ext uri="{FF2B5EF4-FFF2-40B4-BE49-F238E27FC236}">
-                <a16:creationId xmlns:a16="http://schemas.microsoft.com/office/drawing/2014/main" id="{57947BED-DD0E-474D-8A3B-BA2E040D5BB8}"/>
+                <a16:creationId xmlns:a16="http://schemas.microsoft.com/office/drawing/2014/main" xmlns="" id="{57947BED-DD0E-474D-8A3B-BA2E040D5BB8}"/>
               </a:ext>
             </a:extLst>
           </p:cNvPr>
@@ -3315,8 +3368,8 @@
         </p:nvSpPr>
         <p:spPr>
           <a:xfrm>
-            <a:off x="7908653" y="2208212"/>
-            <a:ext cx="7528705" cy="3057247"/>
+            <a:off x="7908653" y="2039482"/>
+            <a:ext cx="7528705" cy="3672800"/>
           </a:xfrm>
           <a:prstGeom prst="rect">
             <a:avLst/>
@@ -3346,26 +3399,53 @@
           </a:bodyPr>
           <a:lstStyle/>
           <a:p>
-            <a:pPr marL="514350" indent="-514350" algn="l" rtl="0" latinLnBrk="1" hangingPunct="0">
-              <a:buAutoNum type="arabicPeriod"/>
-            </a:pPr>
-            <a:r>
-              <a:rPr lang="en-US" dirty="0">
+            <a:pPr algn="l" rtl="0" latinLnBrk="1" hangingPunct="0"/>
+            <a:r>
+              <a:rPr lang="en-US" b="1" dirty="0" smtClean="0">
                 <a:solidFill>
                   <a:srgbClr val="000000"/>
                 </a:solidFill>
               </a:rPr>
-              <a:t>The operation relates to a domain </a:t>
+              <a:t>Properties of a service</a:t>
+            </a:r>
+          </a:p>
+          <a:p>
+            <a:pPr algn="l" rtl="0" latinLnBrk="1" hangingPunct="0"/>
+            <a:endParaRPr lang="en-US" b="1" dirty="0" smtClean="0">
+              <a:solidFill>
+                <a:srgbClr val="000000"/>
+              </a:solidFill>
+            </a:endParaRPr>
+          </a:p>
+          <a:p>
+            <a:pPr marL="514350" indent="-514350" algn="l" rtl="0" latinLnBrk="1" hangingPunct="0">
+              <a:buAutoNum type="arabicPeriod"/>
+            </a:pPr>
+            <a:r>
+              <a:rPr lang="en-US" sz="2800" dirty="0" smtClean="0">
+                <a:solidFill>
+                  <a:srgbClr val="000000"/>
+                </a:solidFill>
+              </a:rPr>
+              <a:t>The </a:t>
+            </a:r>
+            <a:r>
+              <a:rPr lang="en-US" sz="2800" dirty="0">
+                <a:solidFill>
+                  <a:srgbClr val="000000"/>
+                </a:solidFill>
+              </a:rPr>
+              <a:t>operation relates to a domain </a:t>
             </a:r>
             <a:br>
-              <a:rPr lang="en-US" dirty="0">
+              <a:rPr lang="en-US" sz="2800" dirty="0">
                 <a:solidFill>
                   <a:srgbClr val="000000"/>
                 </a:solidFill>
               </a:rPr>
             </a:br>
             <a:r>
-              <a:rPr lang="en-US" dirty="0">
+              <a:rPr lang="en-US" sz="2800" dirty="0">
                 <a:solidFill>
                   <a:srgbClr val="000000"/>
                 </a:solidFill>
@@ -3373,14 +3453,14 @@
               <a:t>concept that is not a natural part of an </a:t>
             </a:r>
             <a:br>
-              <a:rPr lang="en-US" dirty="0">
+              <a:rPr lang="en-US" sz="2800" dirty="0">
                 <a:solidFill>
                   <a:srgbClr val="000000"/>
                 </a:solidFill>
               </a:rPr>
             </a:br>
             <a:r>
-              <a:rPr lang="en-US" dirty="0">
+              <a:rPr lang="en-US" sz="2800" dirty="0">
                 <a:solidFill>
                   <a:srgbClr val="000000"/>
                 </a:solidFill>
@@ -3393,12 +3473,35 @@
               <a:buAutoNum type="arabicPeriod"/>
             </a:pPr>
             <a:r>
-              <a:rPr lang="en-US" dirty="0">
+              <a:rPr lang="en-US" sz="2800" dirty="0">
                 <a:solidFill>
                   <a:srgbClr val="000000"/>
                 </a:solidFill>
               </a:rPr>
-              <a:t>The interface is defined in terms of other elements of the domain model. </a:t>
+              <a:t>The interface is defined in terms of other </a:t>
+            </a:r>
+            <a:br>
+              <a:rPr lang="en-US" sz="2800" dirty="0">
+                <a:solidFill>
+                  <a:srgbClr val="000000"/>
+                </a:solidFill>
+              </a:rPr>
+            </a:br>
+            <a:r>
+              <a:rPr lang="en-US" sz="2800" dirty="0" smtClean="0">
+                <a:solidFill>
+                  <a:srgbClr val="000000"/>
+                </a:solidFill>
+              </a:rPr>
+              <a:t>elements </a:t>
+            </a:r>
+            <a:r>
+              <a:rPr lang="en-US" sz="2800" dirty="0">
+                <a:solidFill>
+                  <a:srgbClr val="000000"/>
+                </a:solidFill>
+              </a:rPr>
+              <a:t>of the domain model. </a:t>
             </a:r>
           </a:p>
           <a:p>
@@ -3406,7 +3509,7 @@
               <a:buAutoNum type="arabicPeriod"/>
             </a:pPr>
             <a:r>
-              <a:rPr lang="en-US" dirty="0">
+              <a:rPr lang="en-US" sz="2800" dirty="0">
                 <a:solidFill>
                   <a:srgbClr val="000000"/>
                 </a:solidFill>
@@ -3749,7 +3852,7 @@
           <p:cNvPr id="2" name="Title 1">
             <a:extLst>
               <a:ext uri="{FF2B5EF4-FFF2-40B4-BE49-F238E27FC236}">
-                <a16:creationId xmlns:a16="http://schemas.microsoft.com/office/drawing/2014/main" id="{2077528A-B2E1-46FF-B35A-10E404B4E9A1}"/>
+                <a16:creationId xmlns:a16="http://schemas.microsoft.com/office/drawing/2014/main" xmlns="" id="{C8BBA089-6769-41A2-9B7B-CB8F669AF258}"/>
               </a:ext>
             </a:extLst>
           </p:cNvPr>
@@ -3767,9 +3870,9 @@
           <a:p>
             <a:r>
               <a:rPr lang="en-US" dirty="0"/>
-              <a:t>Large-scale structure</a:t>
-            </a:r>
-            <a:endParaRPr lang="en-NL" dirty="0"/>
+              <a:t>References</a:t>
+            </a:r>
+            <a:endParaRPr lang="x-none" dirty="0"/>
           </a:p>
         </p:txBody>
       </p:sp>
@@ -3778,7 +3881,7 @@
           <p:cNvPr id="3" name="Text Placeholder 2">
             <a:extLst>
               <a:ext uri="{FF2B5EF4-FFF2-40B4-BE49-F238E27FC236}">
-                <a16:creationId xmlns:a16="http://schemas.microsoft.com/office/drawing/2014/main" id="{180308FF-AF4E-4259-A6BA-FC80ED80DC56}"/>
+                <a16:creationId xmlns:a16="http://schemas.microsoft.com/office/drawing/2014/main" xmlns="" id="{425F16C7-7362-496C-893C-EBB50DDF695F}"/>
               </a:ext>
             </a:extLst>
           </p:cNvPr>
@@ -3796,350 +3899,41 @@
           <a:p>
             <a:r>
               <a:rPr lang="en-US" dirty="0"/>
-              <a:t>system metaphor</a:t>
-            </a:r>
-          </a:p>
-          <a:p>
+              <a:t>Building </a:t>
+            </a:r>
+            <a:r>
+              <a:rPr lang="en-US" dirty="0" err="1"/>
+              <a:t>Microservices</a:t>
+            </a:r>
             <a:r>
               <a:rPr lang="en-US" dirty="0"/>
-              <a:t>responsibility layers </a:t>
-            </a:r>
-          </a:p>
-          <a:p>
-            <a:r>
-              <a:rPr lang="en-US" dirty="0"/>
-              <a:t>knowledge level</a:t>
-            </a:r>
-          </a:p>
-          <a:p>
-            <a:endParaRPr lang="en-NL" dirty="0"/>
-          </a:p>
-        </p:txBody>
-      </p:sp>
-      <p:pic>
-        <p:nvPicPr>
-          <p:cNvPr id="4" name="Picture 3">
-            <a:extLst>
-              <a:ext uri="{FF2B5EF4-FFF2-40B4-BE49-F238E27FC236}">
-                <a16:creationId xmlns:a16="http://schemas.microsoft.com/office/drawing/2014/main" id="{47CDDAFD-3620-4E54-8B2E-D656A069EC85}"/>
-              </a:ext>
-            </a:extLst>
-          </p:cNvPr>
-          <p:cNvPicPr>
-            <a:picLocks noChangeAspect="1"/>
-          </p:cNvPicPr>
-          <p:nvPr/>
-        </p:nvPicPr>
-        <p:blipFill>
-          <a:blip r:embed="rId2"/>
-          <a:stretch>
-            <a:fillRect/>
-          </a:stretch>
-        </p:blipFill>
-        <p:spPr>
-          <a:xfrm>
-            <a:off x="7679174" y="2039482"/>
-            <a:ext cx="7509510" cy="4023360"/>
-          </a:xfrm>
-          <a:prstGeom prst="rect">
-            <a:avLst/>
-          </a:prstGeom>
-        </p:spPr>
-      </p:pic>
-      <p:pic>
-        <p:nvPicPr>
-          <p:cNvPr id="5" name="Picture 4">
-            <a:extLst>
-              <a:ext uri="{FF2B5EF4-FFF2-40B4-BE49-F238E27FC236}">
-                <a16:creationId xmlns:a16="http://schemas.microsoft.com/office/drawing/2014/main" id="{DEEA90D0-F340-4EB1-823D-2B4DE6F3AAAE}"/>
-              </a:ext>
-            </a:extLst>
-          </p:cNvPr>
-          <p:cNvPicPr>
-            <a:picLocks noChangeAspect="1"/>
-          </p:cNvPicPr>
-          <p:nvPr/>
-        </p:nvPicPr>
-        <p:blipFill>
-          <a:blip r:embed="rId3"/>
-          <a:stretch>
-            <a:fillRect/>
-          </a:stretch>
-        </p:blipFill>
-        <p:spPr>
-          <a:xfrm>
-            <a:off x="7679173" y="2039481"/>
-            <a:ext cx="7372350" cy="3600450"/>
-          </a:xfrm>
-          <a:prstGeom prst="rect">
-            <a:avLst/>
-          </a:prstGeom>
-        </p:spPr>
-      </p:pic>
-    </p:spTree>
-    <p:extLst>
-      <p:ext uri="{BB962C8B-B14F-4D97-AF65-F5344CB8AC3E}">
-        <p14:creationId xmlns:p14="http://schemas.microsoft.com/office/powerpoint/2010/main" val="1231889449"/>
-      </p:ext>
-    </p:extLst>
-  </p:cSld>
-  <p:clrMapOvr>
-    <a:masterClrMapping/>
-  </p:clrMapOvr>
-  <p:transition spd="med"/>
-  <p:timing>
-    <p:tnLst>
-      <p:par>
-        <p:cTn id="1" dur="indefinite" restart="never" nodeType="tmRoot">
-          <p:childTnLst>
-            <p:seq concurrent="1" nextAc="seek">
-              <p:cTn id="2" dur="indefinite" nodeType="mainSeq">
-                <p:childTnLst>
-                  <p:par>
-                    <p:cTn id="3" fill="hold">
-                      <p:stCondLst>
-                        <p:cond delay="indefinite"/>
-                      </p:stCondLst>
-                      <p:childTnLst>
-                        <p:par>
-                          <p:cTn id="4" fill="hold">
-                            <p:stCondLst>
-                              <p:cond delay="0"/>
-                            </p:stCondLst>
-                            <p:childTnLst>
-                              <p:par>
-                                <p:cTn id="5" presetID="1" presetClass="entr" presetSubtype="0" fill="hold" nodeType="clickEffect">
-                                  <p:stCondLst>
-                                    <p:cond delay="0"/>
-                                  </p:stCondLst>
-                                  <p:childTnLst>
-                                    <p:set>
-                                      <p:cBhvr>
-                                        <p:cTn id="6" dur="1" fill="hold">
-                                          <p:stCondLst>
-                                            <p:cond delay="0"/>
-                                          </p:stCondLst>
-                                        </p:cTn>
-                                        <p:tgtEl>
-                                          <p:spTgt spid="4"/>
-                                        </p:tgtEl>
-                                        <p:attrNameLst>
-                                          <p:attrName>style.visibility</p:attrName>
-                                        </p:attrNameLst>
-                                      </p:cBhvr>
-                                      <p:to>
-                                        <p:strVal val="visible"/>
-                                      </p:to>
-                                    </p:set>
-                                  </p:childTnLst>
-                                </p:cTn>
-                              </p:par>
-                            </p:childTnLst>
-                          </p:cTn>
-                        </p:par>
-                      </p:childTnLst>
-                    </p:cTn>
-                  </p:par>
-                  <p:par>
-                    <p:cTn id="7" fill="hold">
-                      <p:stCondLst>
-                        <p:cond delay="indefinite"/>
-                      </p:stCondLst>
-                      <p:childTnLst>
-                        <p:par>
-                          <p:cTn id="8" fill="hold">
-                            <p:stCondLst>
-                              <p:cond delay="0"/>
-                            </p:stCondLst>
-                            <p:childTnLst>
-                              <p:par>
-                                <p:cTn id="9" presetID="1" presetClass="exit" presetSubtype="0" fill="hold" nodeType="clickEffect">
-                                  <p:stCondLst>
-                                    <p:cond delay="0"/>
-                                  </p:stCondLst>
-                                  <p:childTnLst>
-                                    <p:set>
-                                      <p:cBhvr>
-                                        <p:cTn id="10" dur="1" fill="hold">
-                                          <p:stCondLst>
-                                            <p:cond delay="0"/>
-                                          </p:stCondLst>
-                                        </p:cTn>
-                                        <p:tgtEl>
-                                          <p:spTgt spid="4"/>
-                                        </p:tgtEl>
-                                        <p:attrNameLst>
-                                          <p:attrName>style.visibility</p:attrName>
-                                        </p:attrNameLst>
-                                      </p:cBhvr>
-                                      <p:to>
-                                        <p:strVal val="hidden"/>
-                                      </p:to>
-                                    </p:set>
-                                  </p:childTnLst>
-                                </p:cTn>
-                              </p:par>
-                              <p:par>
-                                <p:cTn id="11" presetID="1" presetClass="entr" presetSubtype="0" fill="hold" nodeType="withEffect">
-                                  <p:stCondLst>
-                                    <p:cond delay="0"/>
-                                  </p:stCondLst>
-                                  <p:childTnLst>
-                                    <p:set>
-                                      <p:cBhvr>
-                                        <p:cTn id="12" dur="1" fill="hold">
-                                          <p:stCondLst>
-                                            <p:cond delay="0"/>
-                                          </p:stCondLst>
-                                        </p:cTn>
-                                        <p:tgtEl>
-                                          <p:spTgt spid="5"/>
-                                        </p:tgtEl>
-                                        <p:attrNameLst>
-                                          <p:attrName>style.visibility</p:attrName>
-                                        </p:attrNameLst>
-                                      </p:cBhvr>
-                                      <p:to>
-                                        <p:strVal val="visible"/>
-                                      </p:to>
-                                    </p:set>
-                                  </p:childTnLst>
-                                </p:cTn>
-                              </p:par>
-                            </p:childTnLst>
-                          </p:cTn>
-                        </p:par>
-                      </p:childTnLst>
-                    </p:cTn>
-                  </p:par>
-                </p:childTnLst>
-              </p:cTn>
-              <p:prevCondLst>
-                <p:cond evt="onPrev" delay="0">
-                  <p:tgtEl>
-                    <p:sldTgt/>
-                  </p:tgtEl>
-                </p:cond>
-              </p:prevCondLst>
-              <p:nextCondLst>
-                <p:cond evt="onNext" delay="0">
-                  <p:tgtEl>
-                    <p:sldTgt/>
-                  </p:tgtEl>
-                </p:cond>
-              </p:nextCondLst>
-            </p:seq>
-          </p:childTnLst>
-        </p:cTn>
-      </p:par>
-    </p:tnLst>
-  </p:timing>
-</p:sld>
-</file>
-
-<file path=ppt/slides/slide8.xml><?xml version="1.0" encoding="utf-8"?>
-<p:sld xmlns:a="http://schemas.openxmlformats.org/drawingml/2006/main" xmlns:r="http://schemas.openxmlformats.org/officeDocument/2006/relationships" xmlns:p="http://schemas.openxmlformats.org/presentationml/2006/main">
-  <p:cSld>
-    <p:spTree>
-      <p:nvGrpSpPr>
-        <p:cNvPr id="1" name=""/>
-        <p:cNvGrpSpPr/>
-        <p:nvPr/>
-      </p:nvGrpSpPr>
-      <p:grpSpPr>
-        <a:xfrm>
-          <a:off x="0" y="0"/>
-          <a:ext cx="0" cy="0"/>
-          <a:chOff x="0" y="0"/>
-          <a:chExt cx="0" cy="0"/>
-        </a:xfrm>
-      </p:grpSpPr>
-      <p:sp>
-        <p:nvSpPr>
-          <p:cNvPr id="2" name="Title 1">
-            <a:extLst>
-              <a:ext uri="{FF2B5EF4-FFF2-40B4-BE49-F238E27FC236}">
-                <a16:creationId xmlns:a16="http://schemas.microsoft.com/office/drawing/2014/main" id="{C8BBA089-6769-41A2-9B7B-CB8F669AF258}"/>
-              </a:ext>
-            </a:extLst>
-          </p:cNvPr>
-          <p:cNvSpPr>
-            <a:spLocks noGrp="1"/>
-          </p:cNvSpPr>
-          <p:nvPr>
-            <p:ph type="title"/>
-          </p:nvPr>
-        </p:nvSpPr>
-        <p:spPr/>
-        <p:txBody>
-          <a:bodyPr/>
-          <a:lstStyle/>
-          <a:p>
-            <a:r>
-              <a:rPr lang="en-US" dirty="0"/>
-              <a:t>References</a:t>
-            </a:r>
-            <a:endParaRPr lang="en-NL" dirty="0"/>
-          </a:p>
-        </p:txBody>
-      </p:sp>
-      <p:sp>
-        <p:nvSpPr>
-          <p:cNvPr id="3" name="Text Placeholder 2">
-            <a:extLst>
-              <a:ext uri="{FF2B5EF4-FFF2-40B4-BE49-F238E27FC236}">
-                <a16:creationId xmlns:a16="http://schemas.microsoft.com/office/drawing/2014/main" id="{425F16C7-7362-496C-893C-EBB50DDF695F}"/>
-              </a:ext>
-            </a:extLst>
-          </p:cNvPr>
-          <p:cNvSpPr>
-            <a:spLocks noGrp="1"/>
-          </p:cNvSpPr>
-          <p:nvPr>
-            <p:ph type="body" idx="1"/>
-          </p:nvPr>
-        </p:nvSpPr>
-        <p:spPr/>
-        <p:txBody>
-          <a:bodyPr/>
-          <a:lstStyle/>
-          <a:p>
-            <a:r>
-              <a:rPr lang="en-US" dirty="0"/>
-              <a:t>Building Microservices </a:t>
-            </a:r>
-          </a:p>
-          <a:p>
-            <a:pPr lvl="1"/>
-            <a:r>
-              <a:rPr lang="en-US" dirty="0"/>
-              <a:t>Sam Newman</a:t>
-            </a:r>
+              <a:t> </a:t>
+            </a:r>
+            <a:r>
+              <a:rPr lang="en-US" dirty="0" smtClean="0"/>
+              <a:t>(Sam Newman)</a:t>
+            </a:r>
+            <a:endParaRPr lang="en-US" dirty="0"/>
           </a:p>
           <a:p>
             <a:r>
               <a:rPr lang="en-US" dirty="0"/>
               <a:t>Domain Driven Design </a:t>
             </a:r>
-          </a:p>
-          <a:p>
-            <a:pPr lvl="1"/>
-            <a:r>
-              <a:rPr lang="en-US" dirty="0"/>
-              <a:t>Eric Evans</a:t>
-            </a:r>
+            <a:r>
+              <a:rPr lang="en-US" dirty="0" smtClean="0"/>
+              <a:t>(Eric Evans)</a:t>
+            </a:r>
+            <a:endParaRPr lang="en-US" dirty="0"/>
           </a:p>
           <a:p>
             <a:r>
               <a:rPr lang="en-US" dirty="0"/>
               <a:t>Microservice Architecture </a:t>
             </a:r>
-          </a:p>
-          <a:p>
-            <a:pPr lvl="1"/>
-            <a:r>
-              <a:rPr lang="en-US" dirty="0"/>
-              <a:t>Irakli </a:t>
+            <a:r>
+              <a:rPr lang="en-US" dirty="0" smtClean="0"/>
+              <a:t>(I. </a:t>
             </a:r>
             <a:r>
               <a:rPr lang="en-US" dirty="0" err="1"/>
@@ -4147,24 +3941,81 @@
             </a:r>
             <a:r>
               <a:rPr lang="en-US" dirty="0"/>
-              <a:t>, Ronnie Mitra, Matt McLarty &amp; Mike Amundsen </a:t>
-            </a:r>
+              <a:t>, </a:t>
+            </a:r>
+            <a:r>
+              <a:rPr lang="en-US" dirty="0" smtClean="0"/>
+              <a:t>R. </a:t>
+            </a:r>
+            <a:r>
+              <a:rPr lang="en-US" dirty="0"/>
+              <a:t>Mitra, </a:t>
+            </a:r>
+            <a:r>
+              <a:rPr lang="en-US" dirty="0" smtClean="0"/>
+              <a:t>M. </a:t>
+            </a:r>
+            <a:r>
+              <a:rPr lang="en-US" dirty="0"/>
+              <a:t>McLarty &amp; </a:t>
+            </a:r>
+            <a:r>
+              <a:rPr lang="en-US" dirty="0" smtClean="0"/>
+              <a:t>M. Amundsen)</a:t>
+            </a:r>
+            <a:endParaRPr lang="en-US" dirty="0"/>
           </a:p>
           <a:p>
             <a:r>
               <a:rPr lang="en-US" dirty="0"/>
               <a:t>Microservices for Java Developers </a:t>
             </a:r>
-          </a:p>
-          <a:p>
-            <a:pPr lvl="1"/>
+            <a:r>
+              <a:rPr lang="en-US" dirty="0" smtClean="0"/>
+              <a:t>(Christian Posta)</a:t>
+            </a:r>
+          </a:p>
+          <a:p>
             <a:r>
               <a:rPr lang="en-US" dirty="0"/>
-              <a:t>Christian Posta</a:t>
-            </a:r>
-          </a:p>
-          <a:p>
-            <a:endParaRPr lang="en-NL" dirty="0"/>
+              <a:t>Hexagonal at Scale, with DDD and </a:t>
+            </a:r>
+            <a:r>
+              <a:rPr lang="en-US" dirty="0" err="1"/>
+              <a:t>microservices</a:t>
+            </a:r>
+            <a:r>
+              <a:rPr lang="en-US" dirty="0" smtClean="0"/>
+              <a:t>! (</a:t>
+            </a:r>
+            <a:r>
+              <a:rPr lang="en-US" dirty="0" err="1" smtClean="0"/>
+              <a:t>Cyrille</a:t>
+            </a:r>
+            <a:r>
+              <a:rPr lang="en-US" dirty="0" smtClean="0"/>
+              <a:t> </a:t>
+            </a:r>
+            <a:r>
+              <a:rPr lang="en-US" dirty="0" err="1" smtClean="0"/>
+              <a:t>Martraire</a:t>
+            </a:r>
+            <a:r>
+              <a:rPr lang="en-US" dirty="0" smtClean="0"/>
+              <a:t> – video will be on </a:t>
+            </a:r>
+            <a:r>
+              <a:rPr lang="en-US" dirty="0" err="1" smtClean="0"/>
+              <a:t>Youtube</a:t>
+            </a:r>
+            <a:r>
+              <a:rPr lang="en-US" dirty="0" smtClean="0"/>
+              <a:t>)</a:t>
+            </a:r>
+            <a:endParaRPr lang="en-US" dirty="0"/>
+          </a:p>
+          <a:p>
+            <a:endParaRPr lang="x-none" dirty="0"/>
           </a:p>
         </p:txBody>
       </p:sp>
@@ -4179,6 +4030,13 @@
     <a:masterClrMapping/>
   </p:clrMapOvr>
   <p:transition spd="med"/>
+  <p:timing>
+    <p:tnLst>
+      <p:par>
+        <p:cTn id="1" dur="indefinite" restart="never" nodeType="tmRoot"/>
+      </p:par>
+    </p:tnLst>
+  </p:timing>
 </p:sld>
 </file>
 

</xml_diff>